<commit_message>
Atualiza apresentação chat sockets
</commit_message>
<xml_diff>
--- a/chat-sockets.pptx
+++ b/chat-sockets.pptx
@@ -219,7 +219,7 @@
           <a:p>
             <a:fld id="{7497B6E1-7C5B-524D-B5EB-5E6695205380}" type="datetimeFigureOut">
               <a:rPr lang="pt-BR" smtClean="0"/>
-              <a:t>02/11/2020</a:t>
+              <a:t>05/09/2022</a:t>
             </a:fld>
             <a:endParaRPr lang="pt-BR"/>
           </a:p>
@@ -657,7 +657,7 @@
           <a:p>
             <a:fld id="{19E7D63B-43B5-8A4C-BD12-76889BE136BD}" type="datetime1">
               <a:rPr lang="en-US" smtClean="0"/>
-              <a:t>11/2/20</a:t>
+              <a:t>9/5/22</a:t>
             </a:fld>
             <a:endParaRPr lang="en-US" dirty="0"/>
           </a:p>
@@ -924,7 +924,7 @@
           <a:p>
             <a:fld id="{124E9894-F119-A64C-B7CB-D7CE860A73BE}" type="datetime1">
               <a:rPr lang="en-US" smtClean="0"/>
-              <a:t>11/2/20</a:t>
+              <a:t>9/5/22</a:t>
             </a:fld>
             <a:endParaRPr lang="en-US" dirty="0"/>
           </a:p>
@@ -1156,7 +1156,7 @@
           <a:p>
             <a:fld id="{124E9894-F119-A64C-B7CB-D7CE860A73BE}" type="datetime1">
               <a:rPr lang="en-US" smtClean="0"/>
-              <a:t>11/2/20</a:t>
+              <a:t>9/5/22</a:t>
             </a:fld>
             <a:endParaRPr lang="en-US" dirty="0"/>
           </a:p>
@@ -1467,7 +1467,7 @@
           <a:p>
             <a:fld id="{124E9894-F119-A64C-B7CB-D7CE860A73BE}" type="datetime1">
               <a:rPr lang="en-US" smtClean="0"/>
-              <a:t>11/2/20</a:t>
+              <a:t>9/5/22</a:t>
             </a:fld>
             <a:endParaRPr lang="en-US" dirty="0"/>
           </a:p>
@@ -1941,7 +1941,7 @@
           <a:p>
             <a:fld id="{B4BBB50B-BAA3-9748-978F-08A7877AB7D9}" type="datetime1">
               <a:rPr lang="en-US" smtClean="0"/>
-              <a:t>11/2/20</a:t>
+              <a:t>9/5/22</a:t>
             </a:fld>
             <a:endParaRPr lang="en-US" dirty="0"/>
           </a:p>
@@ -2488,7 +2488,7 @@
           <a:p>
             <a:fld id="{124E9894-F119-A64C-B7CB-D7CE860A73BE}" type="datetime1">
               <a:rPr lang="en-US" smtClean="0"/>
-              <a:t>11/2/20</a:t>
+              <a:t>9/5/22</a:t>
             </a:fld>
             <a:endParaRPr lang="en-US" dirty="0"/>
           </a:p>
@@ -3263,7 +3263,7 @@
           <a:p>
             <a:fld id="{124E9894-F119-A64C-B7CB-D7CE860A73BE}" type="datetime1">
               <a:rPr lang="en-US" smtClean="0"/>
-              <a:t>11/2/20</a:t>
+              <a:t>9/5/22</a:t>
             </a:fld>
             <a:endParaRPr lang="en-US" dirty="0"/>
           </a:p>
@@ -3439,7 +3439,7 @@
           <a:p>
             <a:fld id="{45040DEA-CE02-EF42-8F10-34F709D8505D}" type="datetime1">
               <a:rPr lang="en-US" smtClean="0"/>
-              <a:t>11/2/20</a:t>
+              <a:t>9/5/22</a:t>
             </a:fld>
             <a:endParaRPr lang="en-US" dirty="0"/>
           </a:p>
@@ -3662,7 +3662,7 @@
           <a:p>
             <a:fld id="{A0C1C801-5706-434E-AB65-DDFBCF1F55D2}" type="datetime1">
               <a:rPr lang="en-US" smtClean="0"/>
-              <a:t>11/2/20</a:t>
+              <a:t>9/5/22</a:t>
             </a:fld>
             <a:endParaRPr lang="en-US" dirty="0"/>
           </a:p>
@@ -3842,7 +3842,7 @@
           <a:p>
             <a:fld id="{39AE0FD8-7D7B-EA4F-8AF8-8B97820A0C5D}" type="datetime1">
               <a:rPr lang="en-US" smtClean="0"/>
-              <a:t>11/2/20</a:t>
+              <a:t>9/5/22</a:t>
             </a:fld>
             <a:endParaRPr lang="en-US" dirty="0"/>
           </a:p>
@@ -4131,7 +4131,7 @@
           <a:p>
             <a:fld id="{7FC94D43-3F68-DC43-8EF0-95FB3D51CCCF}" type="datetime1">
               <a:rPr lang="en-US" smtClean="0"/>
-              <a:t>11/2/20</a:t>
+              <a:t>9/5/22</a:t>
             </a:fld>
             <a:endParaRPr lang="en-US" dirty="0"/>
           </a:p>
@@ -4373,7 +4373,7 @@
           <a:p>
             <a:fld id="{BD42CFC2-1CE8-9045-8C9C-0F183F0FB455}" type="datetime1">
               <a:rPr lang="en-US" smtClean="0"/>
-              <a:t>11/2/20</a:t>
+              <a:t>9/5/22</a:t>
             </a:fld>
             <a:endParaRPr lang="en-US" dirty="0"/>
           </a:p>
@@ -4752,7 +4752,7 @@
           <a:p>
             <a:fld id="{F1B5C6E2-D044-C748-9C41-86C9B2F84EB9}" type="datetime1">
               <a:rPr lang="en-US" smtClean="0"/>
-              <a:t>11/2/20</a:t>
+              <a:t>9/5/22</a:t>
             </a:fld>
             <a:endParaRPr lang="en-US" dirty="0"/>
           </a:p>
@@ -4870,7 +4870,7 @@
           <a:p>
             <a:fld id="{359C32BA-C166-AC45-9FCD-8BF0F43629D9}" type="datetime1">
               <a:rPr lang="en-US" smtClean="0"/>
-              <a:t>11/2/20</a:t>
+              <a:t>9/5/22</a:t>
             </a:fld>
             <a:endParaRPr lang="en-US" dirty="0"/>
           </a:p>
@@ -4965,7 +4965,7 @@
           <a:p>
             <a:fld id="{E5D0D591-4B92-A44B-A0EA-798E76AD0368}" type="datetime1">
               <a:rPr lang="en-US" smtClean="0"/>
-              <a:t>11/2/20</a:t>
+              <a:t>9/5/22</a:t>
             </a:fld>
             <a:endParaRPr lang="en-US" dirty="0"/>
           </a:p>
@@ -5214,7 +5214,7 @@
           <a:p>
             <a:fld id="{8201F472-E17F-4B47-A44B-A2249FA27ED2}" type="datetime1">
               <a:rPr lang="en-US" smtClean="0"/>
-              <a:t>11/2/20</a:t>
+              <a:t>9/5/22</a:t>
             </a:fld>
             <a:endParaRPr lang="en-US" dirty="0"/>
           </a:p>
@@ -5471,7 +5471,7 @@
           <a:p>
             <a:fld id="{8BEFB9EE-CDF2-6F49-80F4-278D1604F10C}" type="datetime1">
               <a:rPr lang="en-US" smtClean="0"/>
-              <a:t>11/2/20</a:t>
+              <a:t>9/5/22</a:t>
             </a:fld>
             <a:endParaRPr lang="en-US" dirty="0"/>
           </a:p>
@@ -5717,7 +5717,7 @@
           <a:p>
             <a:fld id="{124E9894-F119-A64C-B7CB-D7CE860A73BE}" type="datetime1">
               <a:rPr lang="en-US" smtClean="0"/>
-              <a:t>11/2/20</a:t>
+              <a:t>9/5/22</a:t>
             </a:fld>
             <a:endParaRPr lang="en-US" dirty="0"/>
           </a:p>
@@ -6210,7 +6210,7 @@
         </p:nvSpPr>
         <p:spPr>
           <a:xfrm>
-            <a:off x="2274419" y="3997891"/>
+            <a:off x="1190202" y="3906451"/>
             <a:ext cx="8915399" cy="1726938"/>
           </a:xfrm>
         </p:spPr>
@@ -6239,46 +6239,38 @@
               <a:t>Instituto Federal de Educação do Tocantins (IFTO, Campus Palmas)</a:t>
             </a:r>
           </a:p>
-          <a:p>
-            <a:r>
-              <a:rPr lang="pt-BR" b="1" dirty="0">
-                <a:solidFill>
-                  <a:schemeClr val="bg1"/>
-                </a:solidFill>
-                <a:hlinkClick r:id="rId3"/>
-              </a:rPr>
-              <a:t>http://twitter.com/manoelcampos</a:t>
-            </a:r>
-            <a:r>
-              <a:rPr lang="pt-BR" b="1" dirty="0">
-                <a:solidFill>
-                  <a:schemeClr val="bg1"/>
-                </a:solidFill>
-              </a:rPr>
-              <a:t>  </a:t>
-            </a:r>
-          </a:p>
-          <a:p>
-            <a:r>
-              <a:rPr lang="pt-BR" b="1" dirty="0">
-                <a:solidFill>
-                  <a:schemeClr val="bg1"/>
-                </a:solidFill>
-                <a:hlinkClick r:id="rId4"/>
-              </a:rPr>
-              <a:t>http://github.com/manoelcampos</a:t>
-            </a:r>
-            <a:r>
-              <a:rPr lang="pt-BR" b="1" dirty="0">
-                <a:solidFill>
-                  <a:schemeClr val="bg1"/>
-                </a:solidFill>
-              </a:rPr>
-              <a:t> </a:t>
-            </a:r>
-          </a:p>
-        </p:txBody>
-      </p:sp>
+        </p:txBody>
+      </p:sp>
+      <p:pic>
+        <p:nvPicPr>
+          <p:cNvPr id="5" name="Picture 4" descr="Qr code&#10;&#10;Description automatically generated">
+            <a:extLst>
+              <a:ext uri="{FF2B5EF4-FFF2-40B4-BE49-F238E27FC236}">
+                <a16:creationId xmlns:a16="http://schemas.microsoft.com/office/drawing/2014/main" id="{887C51F0-CE5B-EB4B-ADE8-466E3DC9CF0C}"/>
+              </a:ext>
+            </a:extLst>
+          </p:cNvPr>
+          <p:cNvPicPr>
+            <a:picLocks noChangeAspect="1"/>
+          </p:cNvPicPr>
+          <p:nvPr/>
+        </p:nvPicPr>
+        <p:blipFill>
+          <a:blip r:embed="rId3"/>
+          <a:stretch>
+            <a:fillRect/>
+          </a:stretch>
+        </p:blipFill>
+        <p:spPr>
+          <a:xfrm>
+            <a:off x="9722757" y="4321154"/>
+            <a:ext cx="2434409" cy="2408511"/>
+          </a:xfrm>
+          <a:prstGeom prst="rect">
+            <a:avLst/>
+          </a:prstGeom>
+        </p:spPr>
+      </p:pic>
     </p:spTree>
     <p:extLst>
       <p:ext uri="{BB962C8B-B14F-4D97-AF65-F5344CB8AC3E}">
@@ -12566,12 +12558,6 @@
           <a:p>
             <a:r>
               <a:rPr lang="pt-BR" sz="2800" dirty="0"/>
-              <a:t>Padrões de Projeto é um assunto avançado</a:t>
-            </a:r>
-          </a:p>
-          <a:p>
-            <a:r>
-              <a:rPr lang="pt-BR" sz="2800" dirty="0"/>
               <a:t>Ver livros como</a:t>
             </a:r>
             <a:r>
@@ -12787,110 +12773,6 @@
                                           <p:spTgt spid="2">
                                             <p:txEl>
                                               <p:pRg st="1" end="1"/>
-                                            </p:txEl>
-                                          </p:spTgt>
-                                        </p:tgtEl>
-                                      </p:cBhvr>
-                                    </p:animEffect>
-                                  </p:childTnLst>
-                                </p:cTn>
-                              </p:par>
-                            </p:childTnLst>
-                          </p:cTn>
-                        </p:par>
-                      </p:childTnLst>
-                    </p:cTn>
-                  </p:par>
-                  <p:par>
-                    <p:cTn id="16" fill="hold">
-                      <p:stCondLst>
-                        <p:cond delay="indefinite"/>
-                      </p:stCondLst>
-                      <p:childTnLst>
-                        <p:par>
-                          <p:cTn id="17" fill="hold">
-                            <p:stCondLst>
-                              <p:cond delay="0"/>
-                            </p:stCondLst>
-                            <p:childTnLst>
-                              <p:par>
-                                <p:cTn id="18" presetID="9" presetClass="exit" presetSubtype="0" fill="hold" grpId="1" nodeType="clickEffect">
-                                  <p:stCondLst>
-                                    <p:cond delay="0"/>
-                                  </p:stCondLst>
-                                  <p:childTnLst>
-                                    <p:animEffect transition="out" filter="dissolve">
-                                      <p:cBhvr>
-                                        <p:cTn id="19" dur="500"/>
-                                        <p:tgtEl>
-                                          <p:spTgt spid="2">
-                                            <p:txEl>
-                                              <p:pRg st="1" end="1"/>
-                                            </p:txEl>
-                                          </p:spTgt>
-                                        </p:tgtEl>
-                                      </p:cBhvr>
-                                    </p:animEffect>
-                                    <p:set>
-                                      <p:cBhvr>
-                                        <p:cTn id="20" dur="1" fill="hold">
-                                          <p:stCondLst>
-                                            <p:cond delay="499"/>
-                                          </p:stCondLst>
-                                        </p:cTn>
-                                        <p:tgtEl>
-                                          <p:spTgt spid="2">
-                                            <p:txEl>
-                                              <p:pRg st="1" end="1"/>
-                                            </p:txEl>
-                                          </p:spTgt>
-                                        </p:tgtEl>
-                                        <p:attrNameLst>
-                                          <p:attrName>style.visibility</p:attrName>
-                                        </p:attrNameLst>
-                                      </p:cBhvr>
-                                      <p:to>
-                                        <p:strVal val="hidden"/>
-                                      </p:to>
-                                    </p:set>
-                                  </p:childTnLst>
-                                </p:cTn>
-                              </p:par>
-                              <p:par>
-                                <p:cTn id="21" presetID="9" presetClass="entr" presetSubtype="0" fill="hold" grpId="0" nodeType="withEffect">
-                                  <p:stCondLst>
-                                    <p:cond delay="0"/>
-                                  </p:stCondLst>
-                                  <p:childTnLst>
-                                    <p:set>
-                                      <p:cBhvr>
-                                        <p:cTn id="22" dur="1" fill="hold">
-                                          <p:stCondLst>
-                                            <p:cond delay="0"/>
-                                          </p:stCondLst>
-                                        </p:cTn>
-                                        <p:tgtEl>
-                                          <p:spTgt spid="2">
-                                            <p:txEl>
-                                              <p:pRg st="2" end="2"/>
-                                            </p:txEl>
-                                          </p:spTgt>
-                                        </p:tgtEl>
-                                        <p:attrNameLst>
-                                          <p:attrName>style.visibility</p:attrName>
-                                        </p:attrNameLst>
-                                      </p:cBhvr>
-                                      <p:to>
-                                        <p:strVal val="visible"/>
-                                      </p:to>
-                                    </p:set>
-                                    <p:animEffect transition="in" filter="dissolve">
-                                      <p:cBhvr>
-                                        <p:cTn id="23" dur="500"/>
-                                        <p:tgtEl>
-                                          <p:spTgt spid="2">
-                                            <p:txEl>
-                                              <p:pRg st="2" end="2"/>
                                             </p:txEl>
                                           </p:spTgt>
                                         </p:tgtEl>
@@ -14836,7 +14718,7 @@
           <a:p>
             <a:r>
               <a:rPr lang="pt-BR" sz="2800" dirty="0"/>
-              <a:t>A comunicação entre as aplicações ocorre por meio de algum protocolo como TCP/IP ou UDP</a:t>
+              <a:t>A comunicação entre as aplicações ocorre por meio de algum protocolo como TCP ou UDP</a:t>
             </a:r>
           </a:p>
         </p:txBody>
@@ -15276,25 +15158,19 @@
           <a:p>
             <a:r>
               <a:rPr lang="pt-BR" sz="2800" dirty="0"/>
-              <a:t>Uma tomada só tem utilidade de fato quando algum aparelho é plugado (conectado) à ela</a:t>
+              <a:t>Só tem utilidade de fato quando algum aparelho é plugado (conectado) à ela</a:t>
             </a:r>
           </a:p>
           <a:p>
             <a:r>
               <a:rPr lang="pt-BR" sz="2800" dirty="0"/>
-              <a:t>Após plugar um aparelho, é fechado um circuito por onde passa eletricidade (comunicação) até o aparelho</a:t>
+              <a:t>Assim é fechado um circuito por onde passa eletricidade (comunicação) até o aparelho</a:t>
             </a:r>
           </a:p>
           <a:p>
             <a:r>
               <a:rPr lang="pt-BR" sz="2800" dirty="0"/>
               <a:t>Em programação, um socket representa um canal de comunicação bi-direcional entre duas aplicações</a:t>
-            </a:r>
-          </a:p>
-          <a:p>
-            <a:r>
-              <a:rPr lang="pt-BR" sz="2800" dirty="0"/>
-              <a:t>Fica a critério das aplicações enviarem e/ou receberem dados por ele</a:t>
             </a:r>
           </a:p>
         </p:txBody>
@@ -15706,110 +15582,6 @@
                       </p:childTnLst>
                     </p:cTn>
                   </p:par>
-                  <p:par>
-                    <p:cTn id="29" fill="hold">
-                      <p:stCondLst>
-                        <p:cond delay="indefinite"/>
-                      </p:stCondLst>
-                      <p:childTnLst>
-                        <p:par>
-                          <p:cTn id="30" fill="hold">
-                            <p:stCondLst>
-                              <p:cond delay="0"/>
-                            </p:stCondLst>
-                            <p:childTnLst>
-                              <p:par>
-                                <p:cTn id="31" presetID="9" presetClass="exit" presetSubtype="0" fill="hold" grpId="1" nodeType="clickEffect">
-                                  <p:stCondLst>
-                                    <p:cond delay="0"/>
-                                  </p:stCondLst>
-                                  <p:childTnLst>
-                                    <p:animEffect transition="out" filter="dissolve">
-                                      <p:cBhvr>
-                                        <p:cTn id="32" dur="500"/>
-                                        <p:tgtEl>
-                                          <p:spTgt spid="3">
-                                            <p:txEl>
-                                              <p:pRg st="3" end="3"/>
-                                            </p:txEl>
-                                          </p:spTgt>
-                                        </p:tgtEl>
-                                      </p:cBhvr>
-                                    </p:animEffect>
-                                    <p:set>
-                                      <p:cBhvr>
-                                        <p:cTn id="33" dur="1" fill="hold">
-                                          <p:stCondLst>
-                                            <p:cond delay="499"/>
-                                          </p:stCondLst>
-                                        </p:cTn>
-                                        <p:tgtEl>
-                                          <p:spTgt spid="3">
-                                            <p:txEl>
-                                              <p:pRg st="3" end="3"/>
-                                            </p:txEl>
-                                          </p:spTgt>
-                                        </p:tgtEl>
-                                        <p:attrNameLst>
-                                          <p:attrName>style.visibility</p:attrName>
-                                        </p:attrNameLst>
-                                      </p:cBhvr>
-                                      <p:to>
-                                        <p:strVal val="hidden"/>
-                                      </p:to>
-                                    </p:set>
-                                  </p:childTnLst>
-                                </p:cTn>
-                              </p:par>
-                              <p:par>
-                                <p:cTn id="34" presetID="9" presetClass="entr" presetSubtype="0" fill="hold" grpId="0" nodeType="withEffect">
-                                  <p:stCondLst>
-                                    <p:cond delay="0"/>
-                                  </p:stCondLst>
-                                  <p:childTnLst>
-                                    <p:set>
-                                      <p:cBhvr>
-                                        <p:cTn id="35" dur="1" fill="hold">
-                                          <p:stCondLst>
-                                            <p:cond delay="0"/>
-                                          </p:stCondLst>
-                                        </p:cTn>
-                                        <p:tgtEl>
-                                          <p:spTgt spid="3">
-                                            <p:txEl>
-                                              <p:pRg st="4" end="4"/>
-                                            </p:txEl>
-                                          </p:spTgt>
-                                        </p:tgtEl>
-                                        <p:attrNameLst>
-                                          <p:attrName>style.visibility</p:attrName>
-                                        </p:attrNameLst>
-                                      </p:cBhvr>
-                                      <p:to>
-                                        <p:strVal val="visible"/>
-                                      </p:to>
-                                    </p:set>
-                                    <p:animEffect transition="in" filter="dissolve">
-                                      <p:cBhvr>
-                                        <p:cTn id="36" dur="500"/>
-                                        <p:tgtEl>
-                                          <p:spTgt spid="3">
-                                            <p:txEl>
-                                              <p:pRg st="4" end="4"/>
-                                            </p:txEl>
-                                          </p:spTgt>
-                                        </p:tgtEl>
-                                      </p:cBhvr>
-                                    </p:animEffect>
-                                  </p:childTnLst>
-                                </p:cTn>
-                              </p:par>
-                            </p:childTnLst>
-                          </p:cTn>
-                        </p:par>
-                      </p:childTnLst>
-                    </p:cTn>
-                  </p:par>
                 </p:childTnLst>
               </p:cTn>
               <p:prevCondLst>
@@ -15926,13 +15698,13 @@
           <a:p>
             <a:r>
               <a:rPr lang="pt-BR" sz="2800" dirty="0"/>
-              <a:t>Tendo-se um socket aberto no servidor, é aberta uma porta por onde conexões podem ser estabelecidas</a:t>
+              <a:t>Socket aberto no servidor: é aberta uma porta por onde conexões podem ser estabelecidas</a:t>
             </a:r>
           </a:p>
           <a:p>
             <a:r>
               <a:rPr lang="pt-BR" sz="2800" dirty="0"/>
-              <a:t>Dizemos que o servidor fica escutando em tal porta</a:t>
+              <a:t>O servidor fica “escutando” em tal porta</a:t>
             </a:r>
           </a:p>
           <a:p>

</xml_diff>

<commit_message>
Atualiza slides chat sockets
</commit_message>
<xml_diff>
--- a/chat-sockets.pptx
+++ b/chat-sockets.pptx
@@ -219,7 +219,7 @@
           <a:p>
             <a:fld id="{7497B6E1-7C5B-524D-B5EB-5E6695205380}" type="datetimeFigureOut">
               <a:rPr lang="pt-BR" smtClean="0"/>
-              <a:t>05/09/2022</a:t>
+              <a:t>06/09/2022</a:t>
             </a:fld>
             <a:endParaRPr lang="pt-BR"/>
           </a:p>
@@ -657,7 +657,7 @@
           <a:p>
             <a:fld id="{19E7D63B-43B5-8A4C-BD12-76889BE136BD}" type="datetime1">
               <a:rPr lang="en-US" smtClean="0"/>
-              <a:t>9/5/22</a:t>
+              <a:t>9/6/22</a:t>
             </a:fld>
             <a:endParaRPr lang="en-US" dirty="0"/>
           </a:p>
@@ -924,7 +924,7 @@
           <a:p>
             <a:fld id="{124E9894-F119-A64C-B7CB-D7CE860A73BE}" type="datetime1">
               <a:rPr lang="en-US" smtClean="0"/>
-              <a:t>9/5/22</a:t>
+              <a:t>9/6/22</a:t>
             </a:fld>
             <a:endParaRPr lang="en-US" dirty="0"/>
           </a:p>
@@ -1156,7 +1156,7 @@
           <a:p>
             <a:fld id="{124E9894-F119-A64C-B7CB-D7CE860A73BE}" type="datetime1">
               <a:rPr lang="en-US" smtClean="0"/>
-              <a:t>9/5/22</a:t>
+              <a:t>9/6/22</a:t>
             </a:fld>
             <a:endParaRPr lang="en-US" dirty="0"/>
           </a:p>
@@ -1467,7 +1467,7 @@
           <a:p>
             <a:fld id="{124E9894-F119-A64C-B7CB-D7CE860A73BE}" type="datetime1">
               <a:rPr lang="en-US" smtClean="0"/>
-              <a:t>9/5/22</a:t>
+              <a:t>9/6/22</a:t>
             </a:fld>
             <a:endParaRPr lang="en-US" dirty="0"/>
           </a:p>
@@ -1941,7 +1941,7 @@
           <a:p>
             <a:fld id="{B4BBB50B-BAA3-9748-978F-08A7877AB7D9}" type="datetime1">
               <a:rPr lang="en-US" smtClean="0"/>
-              <a:t>9/5/22</a:t>
+              <a:t>9/6/22</a:t>
             </a:fld>
             <a:endParaRPr lang="en-US" dirty="0"/>
           </a:p>
@@ -2488,7 +2488,7 @@
           <a:p>
             <a:fld id="{124E9894-F119-A64C-B7CB-D7CE860A73BE}" type="datetime1">
               <a:rPr lang="en-US" smtClean="0"/>
-              <a:t>9/5/22</a:t>
+              <a:t>9/6/22</a:t>
             </a:fld>
             <a:endParaRPr lang="en-US" dirty="0"/>
           </a:p>
@@ -3263,7 +3263,7 @@
           <a:p>
             <a:fld id="{124E9894-F119-A64C-B7CB-D7CE860A73BE}" type="datetime1">
               <a:rPr lang="en-US" smtClean="0"/>
-              <a:t>9/5/22</a:t>
+              <a:t>9/6/22</a:t>
             </a:fld>
             <a:endParaRPr lang="en-US" dirty="0"/>
           </a:p>
@@ -3439,7 +3439,7 @@
           <a:p>
             <a:fld id="{45040DEA-CE02-EF42-8F10-34F709D8505D}" type="datetime1">
               <a:rPr lang="en-US" smtClean="0"/>
-              <a:t>9/5/22</a:t>
+              <a:t>9/6/22</a:t>
             </a:fld>
             <a:endParaRPr lang="en-US" dirty="0"/>
           </a:p>
@@ -3662,7 +3662,7 @@
           <a:p>
             <a:fld id="{A0C1C801-5706-434E-AB65-DDFBCF1F55D2}" type="datetime1">
               <a:rPr lang="en-US" smtClean="0"/>
-              <a:t>9/5/22</a:t>
+              <a:t>9/6/22</a:t>
             </a:fld>
             <a:endParaRPr lang="en-US" dirty="0"/>
           </a:p>
@@ -3842,7 +3842,7 @@
           <a:p>
             <a:fld id="{39AE0FD8-7D7B-EA4F-8AF8-8B97820A0C5D}" type="datetime1">
               <a:rPr lang="en-US" smtClean="0"/>
-              <a:t>9/5/22</a:t>
+              <a:t>9/6/22</a:t>
             </a:fld>
             <a:endParaRPr lang="en-US" dirty="0"/>
           </a:p>
@@ -4131,7 +4131,7 @@
           <a:p>
             <a:fld id="{7FC94D43-3F68-DC43-8EF0-95FB3D51CCCF}" type="datetime1">
               <a:rPr lang="en-US" smtClean="0"/>
-              <a:t>9/5/22</a:t>
+              <a:t>9/6/22</a:t>
             </a:fld>
             <a:endParaRPr lang="en-US" dirty="0"/>
           </a:p>
@@ -4373,7 +4373,7 @@
           <a:p>
             <a:fld id="{BD42CFC2-1CE8-9045-8C9C-0F183F0FB455}" type="datetime1">
               <a:rPr lang="en-US" smtClean="0"/>
-              <a:t>9/5/22</a:t>
+              <a:t>9/6/22</a:t>
             </a:fld>
             <a:endParaRPr lang="en-US" dirty="0"/>
           </a:p>
@@ -4752,7 +4752,7 @@
           <a:p>
             <a:fld id="{F1B5C6E2-D044-C748-9C41-86C9B2F84EB9}" type="datetime1">
               <a:rPr lang="en-US" smtClean="0"/>
-              <a:t>9/5/22</a:t>
+              <a:t>9/6/22</a:t>
             </a:fld>
             <a:endParaRPr lang="en-US" dirty="0"/>
           </a:p>
@@ -4870,7 +4870,7 @@
           <a:p>
             <a:fld id="{359C32BA-C166-AC45-9FCD-8BF0F43629D9}" type="datetime1">
               <a:rPr lang="en-US" smtClean="0"/>
-              <a:t>9/5/22</a:t>
+              <a:t>9/6/22</a:t>
             </a:fld>
             <a:endParaRPr lang="en-US" dirty="0"/>
           </a:p>
@@ -4965,7 +4965,7 @@
           <a:p>
             <a:fld id="{E5D0D591-4B92-A44B-A0EA-798E76AD0368}" type="datetime1">
               <a:rPr lang="en-US" smtClean="0"/>
-              <a:t>9/5/22</a:t>
+              <a:t>9/6/22</a:t>
             </a:fld>
             <a:endParaRPr lang="en-US" dirty="0"/>
           </a:p>
@@ -5214,7 +5214,7 @@
           <a:p>
             <a:fld id="{8201F472-E17F-4B47-A44B-A2249FA27ED2}" type="datetime1">
               <a:rPr lang="en-US" smtClean="0"/>
-              <a:t>9/5/22</a:t>
+              <a:t>9/6/22</a:t>
             </a:fld>
             <a:endParaRPr lang="en-US" dirty="0"/>
           </a:p>
@@ -5471,7 +5471,7 @@
           <a:p>
             <a:fld id="{8BEFB9EE-CDF2-6F49-80F4-278D1604F10C}" type="datetime1">
               <a:rPr lang="en-US" smtClean="0"/>
-              <a:t>9/5/22</a:t>
+              <a:t>9/6/22</a:t>
             </a:fld>
             <a:endParaRPr lang="en-US" dirty="0"/>
           </a:p>
@@ -5717,7 +5717,7 @@
           <a:p>
             <a:fld id="{124E9894-F119-A64C-B7CB-D7CE860A73BE}" type="datetime1">
               <a:rPr lang="en-US" smtClean="0"/>
-              <a:t>9/5/22</a:t>
+              <a:t>9/6/22</a:t>
             </a:fld>
             <a:endParaRPr lang="en-US" dirty="0"/>
           </a:p>
@@ -9398,10 +9398,7 @@
             <a:r>
               <a:rPr lang="en-US" sz="2800" b="1" dirty="0">
                 <a:solidFill>
-                  <a:schemeClr val="tx1">
-                    <a:lumMod val="95000"/>
-                    <a:lumOff val="5000"/>
-                  </a:schemeClr>
+                  <a:schemeClr val="bg2"/>
                 </a:solidFill>
               </a:rPr>
               <a:t>InputStreamReader</a:t>
@@ -9421,10 +9418,7 @@
             <a:r>
               <a:rPr lang="en-US" sz="2800" i="1" dirty="0">
                 <a:solidFill>
-                  <a:schemeClr val="tx1">
-                    <a:lumMod val="95000"/>
-                    <a:lumOff val="5000"/>
-                  </a:schemeClr>
+                  <a:schemeClr val="bg2"/>
                 </a:solidFill>
               </a:rPr>
               <a:t>int read(char[] cbuf)</a:t>
@@ -10227,10 +10221,7 @@
             <a:r>
               <a:rPr lang="en-US" sz="2800" b="1" dirty="0">
                 <a:solidFill>
-                  <a:schemeClr val="tx1">
-                    <a:lumMod val="95000"/>
-                    <a:lumOff val="5000"/>
-                  </a:schemeClr>
+                  <a:schemeClr val="bg2"/>
                 </a:solidFill>
               </a:rPr>
               <a:t>OutputStreamWritter</a:t>
@@ -10239,10 +10230,7 @@
           <a:p>
             <a:endParaRPr lang="en-US" sz="1000" b="1" dirty="0">
               <a:solidFill>
-                <a:schemeClr val="tx1">
-                  <a:lumMod val="95000"/>
-                  <a:lumOff val="5000"/>
-                </a:schemeClr>
+                <a:schemeClr val="bg2"/>
               </a:solidFill>
             </a:endParaRPr>
           </a:p>
@@ -10250,10 +10238,7 @@
             <a:r>
               <a:rPr lang="en-US" sz="2800" i="1" dirty="0">
                 <a:solidFill>
-                  <a:schemeClr val="tx1">
-                    <a:lumMod val="95000"/>
-                    <a:lumOff val="5000"/>
-                  </a:schemeClr>
+                  <a:schemeClr val="bg2"/>
                 </a:solidFill>
               </a:rPr>
               <a:t>void write(String str)</a:t>
@@ -10263,10 +10248,7 @@
             <a:r>
               <a:rPr lang="en-US" sz="2800" i="1" dirty="0">
                 <a:solidFill>
-                  <a:schemeClr val="tx1">
-                    <a:lumMod val="95000"/>
-                    <a:lumOff val="5000"/>
-                  </a:schemeClr>
+                  <a:schemeClr val="bg2"/>
                 </a:solidFill>
               </a:rPr>
               <a:t>void write(char[] cbuf)</a:t>

</xml_diff>